<commit_message>
Created Todo Android Application
</commit_message>
<xml_diff>
--- a/ANDROID SHORT COURSE/Chat Application Slides.pptx
+++ b/ANDROID SHORT COURSE/Chat Application Slides.pptx
@@ -109,6 +109,11 @@
       </a:defRPr>
     </a:lvl9pPr>
   </p:defaultTextStyle>
+  <p:extLst>
+    <p:ext uri="{EFAFB233-063F-42B5-8137-9DF3F51BA10A}">
+      <p15:sldGuideLst xmlns:p15="http://schemas.microsoft.com/office/powerpoint/2012/main"/>
+    </p:ext>
+  </p:extLst>
 </p:presentation>
 </file>
 
@@ -259,7 +264,7 @@
           <a:p>
             <a:fld id="{ED4859E6-F2A3-44F9-B1DE-7489D097AD31}" type="datetimeFigureOut">
               <a:rPr lang="en-US" smtClean="0"/>
-              <a:t>2/10/2019</a:t>
+              <a:t>2/11/2019</a:t>
             </a:fld>
             <a:endParaRPr lang="en-US"/>
           </a:p>
@@ -457,7 +462,7 @@
           <a:p>
             <a:fld id="{ED4859E6-F2A3-44F9-B1DE-7489D097AD31}" type="datetimeFigureOut">
               <a:rPr lang="en-US" smtClean="0"/>
-              <a:t>2/10/2019</a:t>
+              <a:t>2/11/2019</a:t>
             </a:fld>
             <a:endParaRPr lang="en-US"/>
           </a:p>
@@ -665,7 +670,7 @@
           <a:p>
             <a:fld id="{ED4859E6-F2A3-44F9-B1DE-7489D097AD31}" type="datetimeFigureOut">
               <a:rPr lang="en-US" smtClean="0"/>
-              <a:t>2/10/2019</a:t>
+              <a:t>2/11/2019</a:t>
             </a:fld>
             <a:endParaRPr lang="en-US"/>
           </a:p>
@@ -863,7 +868,7 @@
           <a:p>
             <a:fld id="{ED4859E6-F2A3-44F9-B1DE-7489D097AD31}" type="datetimeFigureOut">
               <a:rPr lang="en-US" smtClean="0"/>
-              <a:t>2/10/2019</a:t>
+              <a:t>2/11/2019</a:t>
             </a:fld>
             <a:endParaRPr lang="en-US"/>
           </a:p>
@@ -1138,7 +1143,7 @@
           <a:p>
             <a:fld id="{ED4859E6-F2A3-44F9-B1DE-7489D097AD31}" type="datetimeFigureOut">
               <a:rPr lang="en-US" smtClean="0"/>
-              <a:t>2/10/2019</a:t>
+              <a:t>2/11/2019</a:t>
             </a:fld>
             <a:endParaRPr lang="en-US"/>
           </a:p>
@@ -1403,7 +1408,7 @@
           <a:p>
             <a:fld id="{ED4859E6-F2A3-44F9-B1DE-7489D097AD31}" type="datetimeFigureOut">
               <a:rPr lang="en-US" smtClean="0"/>
-              <a:t>2/10/2019</a:t>
+              <a:t>2/11/2019</a:t>
             </a:fld>
             <a:endParaRPr lang="en-US"/>
           </a:p>
@@ -1815,7 +1820,7 @@
           <a:p>
             <a:fld id="{ED4859E6-F2A3-44F9-B1DE-7489D097AD31}" type="datetimeFigureOut">
               <a:rPr lang="en-US" smtClean="0"/>
-              <a:t>2/10/2019</a:t>
+              <a:t>2/11/2019</a:t>
             </a:fld>
             <a:endParaRPr lang="en-US"/>
           </a:p>
@@ -1956,7 +1961,7 @@
           <a:p>
             <a:fld id="{ED4859E6-F2A3-44F9-B1DE-7489D097AD31}" type="datetimeFigureOut">
               <a:rPr lang="en-US" smtClean="0"/>
-              <a:t>2/10/2019</a:t>
+              <a:t>2/11/2019</a:t>
             </a:fld>
             <a:endParaRPr lang="en-US"/>
           </a:p>
@@ -2069,7 +2074,7 @@
           <a:p>
             <a:fld id="{ED4859E6-F2A3-44F9-B1DE-7489D097AD31}" type="datetimeFigureOut">
               <a:rPr lang="en-US" smtClean="0"/>
-              <a:t>2/10/2019</a:t>
+              <a:t>2/11/2019</a:t>
             </a:fld>
             <a:endParaRPr lang="en-US"/>
           </a:p>
@@ -2380,7 +2385,7 @@
           <a:p>
             <a:fld id="{ED4859E6-F2A3-44F9-B1DE-7489D097AD31}" type="datetimeFigureOut">
               <a:rPr lang="en-US" smtClean="0"/>
-              <a:t>2/10/2019</a:t>
+              <a:t>2/11/2019</a:t>
             </a:fld>
             <a:endParaRPr lang="en-US"/>
           </a:p>
@@ -2668,7 +2673,7 @@
           <a:p>
             <a:fld id="{ED4859E6-F2A3-44F9-B1DE-7489D097AD31}" type="datetimeFigureOut">
               <a:rPr lang="en-US" smtClean="0"/>
-              <a:t>2/10/2019</a:t>
+              <a:t>2/11/2019</a:t>
             </a:fld>
             <a:endParaRPr lang="en-US"/>
           </a:p>
@@ -2909,7 +2914,7 @@
           <a:p>
             <a:fld id="{ED4859E6-F2A3-44F9-B1DE-7489D097AD31}" type="datetimeFigureOut">
               <a:rPr lang="en-US" smtClean="0"/>
-              <a:t>2/10/2019</a:t>
+              <a:t>2/11/2019</a:t>
             </a:fld>
             <a:endParaRPr lang="en-US"/>
           </a:p>
@@ -3348,8 +3353,12 @@
           <a:lstStyle/>
           <a:p>
             <a:r>
+              <a:rPr lang="en-US"/>
+              <a:t>Chat </a:t>
+            </a:r>
+            <a:r>
               <a:rPr lang="en-US" dirty="0"/>
-              <a:t>UG Chat Application</a:t>
+              <a:t>Application</a:t>
             </a:r>
           </a:p>
         </p:txBody>

</xml_diff>